<commit_message>
updating the migration project
</commit_message>
<xml_diff>
--- a/Economic Indicators of Domestic Migration.pptx
+++ b/Economic Indicators of Domestic Migration.pptx
@@ -214,7 +214,7 @@
           <a:p>
             <a:fld id="{2EB74979-E801-40E7-8A58-74341C45738A}" type="datetimeFigureOut">
               <a:rPr lang="en-US" smtClean="0"/>
-              <a:t>10/11/2019</a:t>
+              <a:t>10/12/2019</a:t>
             </a:fld>
             <a:endParaRPr lang="en-US" dirty="0"/>
           </a:p>
@@ -1085,7 +1085,7 @@
           <a:p>
             <a:fld id="{A19DE180-2409-4693-8D1C-02A58E734648}" type="datetimeFigureOut">
               <a:rPr lang="en-US" smtClean="0"/>
-              <a:t>10/11/2019</a:t>
+              <a:t>10/12/2019</a:t>
             </a:fld>
             <a:endParaRPr lang="en-US" dirty="0"/>
           </a:p>
@@ -1293,7 +1293,7 @@
           <a:p>
             <a:fld id="{A19DE180-2409-4693-8D1C-02A58E734648}" type="datetimeFigureOut">
               <a:rPr lang="en-US" smtClean="0"/>
-              <a:t>10/11/2019</a:t>
+              <a:t>10/12/2019</a:t>
             </a:fld>
             <a:endParaRPr lang="en-US" dirty="0"/>
           </a:p>
@@ -1549,7 +1549,7 @@
           <a:p>
             <a:fld id="{A19DE180-2409-4693-8D1C-02A58E734648}" type="datetimeFigureOut">
               <a:rPr lang="en-US" smtClean="0"/>
-              <a:t>10/11/2019</a:t>
+              <a:t>10/12/2019</a:t>
             </a:fld>
             <a:endParaRPr lang="en-US" dirty="0"/>
           </a:p>
@@ -1723,7 +1723,7 @@
           <a:p>
             <a:fld id="{A19DE180-2409-4693-8D1C-02A58E734648}" type="datetimeFigureOut">
               <a:rPr lang="en-US" smtClean="0"/>
-              <a:t>10/11/2019</a:t>
+              <a:t>10/12/2019</a:t>
             </a:fld>
             <a:endParaRPr lang="en-US" dirty="0"/>
           </a:p>
@@ -2066,7 +2066,7 @@
           <a:p>
             <a:fld id="{A19DE180-2409-4693-8D1C-02A58E734648}" type="datetimeFigureOut">
               <a:rPr lang="en-US" smtClean="0"/>
-              <a:t>10/11/2019</a:t>
+              <a:t>10/12/2019</a:t>
             </a:fld>
             <a:endParaRPr lang="en-US" dirty="0"/>
           </a:p>
@@ -2341,7 +2341,7 @@
           <a:p>
             <a:fld id="{A19DE180-2409-4693-8D1C-02A58E734648}" type="datetimeFigureOut">
               <a:rPr lang="en-US" smtClean="0"/>
-              <a:t>10/11/2019</a:t>
+              <a:t>10/12/2019</a:t>
             </a:fld>
             <a:endParaRPr lang="en-US" dirty="0"/>
           </a:p>
@@ -2720,7 +2720,7 @@
           <a:p>
             <a:fld id="{A19DE180-2409-4693-8D1C-02A58E734648}" type="datetimeFigureOut">
               <a:rPr lang="en-US" smtClean="0"/>
-              <a:t>10/11/2019</a:t>
+              <a:t>10/12/2019</a:t>
             </a:fld>
             <a:endParaRPr lang="en-US" dirty="0"/>
           </a:p>
@@ -2838,7 +2838,7 @@
           <a:p>
             <a:fld id="{A19DE180-2409-4693-8D1C-02A58E734648}" type="datetimeFigureOut">
               <a:rPr lang="en-US" smtClean="0"/>
-              <a:t>10/11/2019</a:t>
+              <a:t>10/12/2019</a:t>
             </a:fld>
             <a:endParaRPr lang="en-US" dirty="0"/>
           </a:p>
@@ -3009,7 +3009,7 @@
           <a:p>
             <a:fld id="{A19DE180-2409-4693-8D1C-02A58E734648}" type="datetimeFigureOut">
               <a:rPr lang="en-US" smtClean="0"/>
-              <a:t>10/11/2019</a:t>
+              <a:t>10/12/2019</a:t>
             </a:fld>
             <a:endParaRPr lang="en-US" dirty="0"/>
           </a:p>
@@ -3363,7 +3363,7 @@
           <a:p>
             <a:fld id="{A19DE180-2409-4693-8D1C-02A58E734648}" type="datetimeFigureOut">
               <a:rPr lang="en-US" smtClean="0"/>
-              <a:t>10/11/2019</a:t>
+              <a:t>10/12/2019</a:t>
             </a:fld>
             <a:endParaRPr lang="en-US" dirty="0"/>
           </a:p>
@@ -3744,7 +3744,7 @@
           <a:p>
             <a:fld id="{A19DE180-2409-4693-8D1C-02A58E734648}" type="datetimeFigureOut">
               <a:rPr lang="en-US" smtClean="0"/>
-              <a:t>10/11/2019</a:t>
+              <a:t>10/12/2019</a:t>
             </a:fld>
             <a:endParaRPr lang="en-US" dirty="0"/>
           </a:p>
@@ -4031,7 +4031,7 @@
           <a:p>
             <a:fld id="{A19DE180-2409-4693-8D1C-02A58E734648}" type="datetimeFigureOut">
               <a:rPr lang="en-US" smtClean="0"/>
-              <a:t>10/11/2019</a:t>
+              <a:t>10/12/2019</a:t>
             </a:fld>
             <a:endParaRPr lang="en-US" dirty="0"/>
           </a:p>
@@ -5623,7 +5623,7 @@
       </p:sp>
       <p:pic>
         <p:nvPicPr>
-          <p:cNvPr id="7" name="Picture 6" descr="A screenshot of a cell phone&#10;&#10;Description automatically generated">
+          <p:cNvPr id="7" name="Picture 6">
             <a:extLst>
               <a:ext uri="{FF2B5EF4-FFF2-40B4-BE49-F238E27FC236}">
                 <a16:creationId xmlns:a16="http://schemas.microsoft.com/office/drawing/2014/main" id="{AF889815-B44B-4161-B571-C02EE793DAD2}"/>
@@ -5643,14 +5643,13 @@
               </a:ext>
             </a:extLst>
           </a:blip>
-          <a:stretch>
-            <a:fillRect/>
-          </a:stretch>
+          <a:srcRect/>
+          <a:stretch/>
         </p:blipFill>
         <p:spPr>
           <a:xfrm>
-            <a:off x="6593405" y="726941"/>
-            <a:ext cx="5131653" cy="3421101"/>
+            <a:off x="6593406" y="726941"/>
+            <a:ext cx="5131651" cy="3421101"/>
           </a:xfrm>
           <a:prstGeom prst="rect">
             <a:avLst/>
@@ -5719,7 +5718,7 @@
       </p:sp>
       <p:pic>
         <p:nvPicPr>
-          <p:cNvPr id="5" name="Content Placeholder 4" descr="A screenshot of a cell phone&#10;&#10;Description automatically generated">
+          <p:cNvPr id="5" name="Content Placeholder 4">
             <a:extLst>
               <a:ext uri="{FF2B5EF4-FFF2-40B4-BE49-F238E27FC236}">
                 <a16:creationId xmlns:a16="http://schemas.microsoft.com/office/drawing/2014/main" id="{D23A6871-0803-4EA5-92AA-6D9A4C306AA6}"/>
@@ -5741,14 +5740,13 @@
               </a:ext>
             </a:extLst>
           </a:blip>
-          <a:stretch>
-            <a:fillRect/>
-          </a:stretch>
+          <a:srcRect/>
+          <a:stretch/>
         </p:blipFill>
         <p:spPr>
           <a:xfrm>
             <a:off x="737612" y="726941"/>
-            <a:ext cx="5118182" cy="3412121"/>
+            <a:ext cx="5118181" cy="3412121"/>
           </a:xfrm>
           <a:prstGeom prst="rect">
             <a:avLst/>
@@ -6464,10 +6462,10 @@
       </p:sp>
       <p:pic>
         <p:nvPicPr>
-          <p:cNvPr id="5" name="Content Placeholder 4" descr="A screenshot of a cell phone&#10;&#10;Description automatically generated">
+          <p:cNvPr id="6" name="Content Placeholder 5">
             <a:extLst>
               <a:ext uri="{FF2B5EF4-FFF2-40B4-BE49-F238E27FC236}">
-                <a16:creationId xmlns:a16="http://schemas.microsoft.com/office/drawing/2014/main" id="{8762F5E5-CA7E-4376-A3B7-4011440D44D0}"/>
+                <a16:creationId xmlns:a16="http://schemas.microsoft.com/office/drawing/2014/main" id="{2F41FF95-59FF-4EA5-89AA-29B20A82648E}"/>
               </a:ext>
             </a:extLst>
           </p:cNvPr>
@@ -6486,18 +6484,14 @@
               </a:ext>
             </a:extLst>
           </a:blip>
-          <a:stretch>
-            <a:fillRect/>
-          </a:stretch>
+          <a:srcRect/>
+          <a:stretch/>
         </p:blipFill>
         <p:spPr>
           <a:xfrm>
-            <a:off x="1379862" y="905933"/>
-            <a:ext cx="9464280" cy="5039728"/>
-          </a:xfrm>
-          <a:prstGeom prst="rect">
-            <a:avLst/>
-          </a:prstGeom>
+            <a:off x="2550415" y="1065277"/>
+            <a:ext cx="7091170" cy="4727446"/>
+          </a:xfrm>
         </p:spPr>
       </p:pic>
     </p:spTree>

</xml_diff>